<commit_message>
fix an small error of null calculation
</commit_message>
<xml_diff>
--- a/Presentation/20200123_Zac/Progress_20200123.pptx
+++ b/Presentation/20200123_Zac/Progress_20200123.pptx
@@ -208,7 +208,7 @@
           <a:p>
             <a:fld id="{27EF3FF2-EB12-4B4D-B269-04BCAABB5705}" type="datetimeFigureOut">
               <a:rPr lang="en-US" smtClean="0"/>
-              <a:t>1/22/2020</a:t>
+              <a:t>1/23/2020</a:t>
             </a:fld>
             <a:endParaRPr lang="en-US"/>
           </a:p>
@@ -606,7 +606,7 @@
           <a:p>
             <a:fld id="{F155834A-1E99-4FF8-940D-88A71EEE7BA3}" type="datetimeFigureOut">
               <a:rPr lang="en-US" smtClean="0"/>
-              <a:t>1/22/2020</a:t>
+              <a:t>1/23/2020</a:t>
             </a:fld>
             <a:endParaRPr lang="en-US"/>
           </a:p>
@@ -776,7 +776,7 @@
           <a:p>
             <a:fld id="{F155834A-1E99-4FF8-940D-88A71EEE7BA3}" type="datetimeFigureOut">
               <a:rPr lang="en-US" smtClean="0"/>
-              <a:t>1/22/2020</a:t>
+              <a:t>1/23/2020</a:t>
             </a:fld>
             <a:endParaRPr lang="en-US"/>
           </a:p>
@@ -956,7 +956,7 @@
           <a:p>
             <a:fld id="{F155834A-1E99-4FF8-940D-88A71EEE7BA3}" type="datetimeFigureOut">
               <a:rPr lang="en-US" smtClean="0"/>
-              <a:t>1/22/2020</a:t>
+              <a:t>1/23/2020</a:t>
             </a:fld>
             <a:endParaRPr lang="en-US"/>
           </a:p>
@@ -1126,7 +1126,7 @@
           <a:p>
             <a:fld id="{F155834A-1E99-4FF8-940D-88A71EEE7BA3}" type="datetimeFigureOut">
               <a:rPr lang="en-US" smtClean="0"/>
-              <a:t>1/22/2020</a:t>
+              <a:t>1/23/2020</a:t>
             </a:fld>
             <a:endParaRPr lang="en-US"/>
           </a:p>
@@ -1372,7 +1372,7 @@
           <a:p>
             <a:fld id="{F155834A-1E99-4FF8-940D-88A71EEE7BA3}" type="datetimeFigureOut">
               <a:rPr lang="en-US" smtClean="0"/>
-              <a:t>1/22/2020</a:t>
+              <a:t>1/23/2020</a:t>
             </a:fld>
             <a:endParaRPr lang="en-US"/>
           </a:p>
@@ -1604,7 +1604,7 @@
           <a:p>
             <a:fld id="{F155834A-1E99-4FF8-940D-88A71EEE7BA3}" type="datetimeFigureOut">
               <a:rPr lang="en-US" smtClean="0"/>
-              <a:t>1/22/2020</a:t>
+              <a:t>1/23/2020</a:t>
             </a:fld>
             <a:endParaRPr lang="en-US"/>
           </a:p>
@@ -1971,7 +1971,7 @@
           <a:p>
             <a:fld id="{F155834A-1E99-4FF8-940D-88A71EEE7BA3}" type="datetimeFigureOut">
               <a:rPr lang="en-US" smtClean="0"/>
-              <a:t>1/22/2020</a:t>
+              <a:t>1/23/2020</a:t>
             </a:fld>
             <a:endParaRPr lang="en-US"/>
           </a:p>
@@ -2089,7 +2089,7 @@
           <a:p>
             <a:fld id="{F155834A-1E99-4FF8-940D-88A71EEE7BA3}" type="datetimeFigureOut">
               <a:rPr lang="en-US" smtClean="0"/>
-              <a:t>1/22/2020</a:t>
+              <a:t>1/23/2020</a:t>
             </a:fld>
             <a:endParaRPr lang="en-US"/>
           </a:p>
@@ -2184,7 +2184,7 @@
           <a:p>
             <a:fld id="{F155834A-1E99-4FF8-940D-88A71EEE7BA3}" type="datetimeFigureOut">
               <a:rPr lang="en-US" smtClean="0"/>
-              <a:t>1/22/2020</a:t>
+              <a:t>1/23/2020</a:t>
             </a:fld>
             <a:endParaRPr lang="en-US"/>
           </a:p>
@@ -2461,7 +2461,7 @@
           <a:p>
             <a:fld id="{F155834A-1E99-4FF8-940D-88A71EEE7BA3}" type="datetimeFigureOut">
               <a:rPr lang="en-US" smtClean="0"/>
-              <a:t>1/22/2020</a:t>
+              <a:t>1/23/2020</a:t>
             </a:fld>
             <a:endParaRPr lang="en-US"/>
           </a:p>
@@ -2718,7 +2718,7 @@
           <a:p>
             <a:fld id="{F155834A-1E99-4FF8-940D-88A71EEE7BA3}" type="datetimeFigureOut">
               <a:rPr lang="en-US" smtClean="0"/>
-              <a:t>1/22/2020</a:t>
+              <a:t>1/23/2020</a:t>
             </a:fld>
             <a:endParaRPr lang="en-US"/>
           </a:p>
@@ -2931,7 +2931,7 @@
           <a:p>
             <a:fld id="{F155834A-1E99-4FF8-940D-88A71EEE7BA3}" type="datetimeFigureOut">
               <a:rPr lang="en-US" smtClean="0"/>
-              <a:t>1/22/2020</a:t>
+              <a:t>1/23/2020</a:t>
             </a:fld>
             <a:endParaRPr lang="en-US"/>
           </a:p>
@@ -8052,10 +8052,10 @@
       </p:grpSpPr>
       <p:pic>
         <p:nvPicPr>
-          <p:cNvPr id="3" name="Picture 2" descr="A close up of a map&#10;&#10;Description automatically generated">
+          <p:cNvPr id="4" name="Picture 3" descr="A close up of a map&#10;&#10;Description automatically generated">
             <a:extLst>
               <a:ext uri="{FF2B5EF4-FFF2-40B4-BE49-F238E27FC236}">
-                <a16:creationId xmlns:a16="http://schemas.microsoft.com/office/drawing/2014/main" id="{95D74429-BF83-4459-9CEE-5C8030211BBF}"/>
+                <a16:creationId xmlns:a16="http://schemas.microsoft.com/office/drawing/2014/main" id="{71098EB9-EC2B-4AD3-94EA-0FA59682EF47}"/>
               </a:ext>
             </a:extLst>
           </p:cNvPr>

</xml_diff>